<commit_message>
More work on NormDist Module
</commit_message>
<xml_diff>
--- a/modules/Normal_Distributions/PPT2.pptx
+++ b/modules/Normal_Distributions/PPT2.pptx
@@ -33610,11 +33610,6 @@
               </a:rPr>
               <a:t>?</a:t>
             </a:r>
-            <a:endParaRPr lang="en-US" sz="3200" b="1" dirty="0">
-              <a:solidFill>
-                <a:schemeClr val="accent1"/>
-              </a:solidFill>
-            </a:endParaRPr>
           </a:p>
         </p:txBody>
       </p:sp>
@@ -34308,7 +34303,15 @@
             </a:pPr>
             <a:r>
               <a:rPr lang="en-US" sz="3000" i="1" dirty="0"/>
-              <a:t>What is the test score such that the 15% of the students score higher?</a:t>
+              <a:t>What is the test score such </a:t>
+            </a:r>
+            <a:r>
+              <a:rPr lang="en-US" sz="3000" i="1" dirty="0" smtClean="0"/>
+              <a:t>that </a:t>
+            </a:r>
+            <a:r>
+              <a:rPr lang="en-US" sz="3000" i="1" dirty="0"/>
+              <a:t>15% of the students score higher?</a:t>
             </a:r>
           </a:p>
           <a:p>

</xml_diff>